<commit_message>
Add techniques to powerpoint
</commit_message>
<xml_diff>
--- a/csc545Powerpoint.pptx
+++ b/csc545Powerpoint.pptx
@@ -11,8 +11,9 @@
     <p:sldId id="259" r:id="rId5"/>
     <p:sldId id="260" r:id="rId6"/>
     <p:sldId id="263" r:id="rId7"/>
-    <p:sldId id="261" r:id="rId8"/>
-    <p:sldId id="262" r:id="rId9"/>
+    <p:sldId id="264" r:id="rId8"/>
+    <p:sldId id="261" r:id="rId9"/>
+    <p:sldId id="262" r:id="rId10"/>
   </p:sldIdLst>
   <p:sldSz cx="12192000" cy="6858000"/>
   <p:notesSz cx="6858000" cy="9144000"/>
@@ -111,6 +112,11 @@
       </a:defRPr>
     </a:lvl9pPr>
   </p:defaultTextStyle>
+  <p:extLst>
+    <p:ext uri="{EFAFB233-063F-42B5-8137-9DF3F51BA10A}">
+      <p15:sldGuideLst xmlns:p15="http://schemas.microsoft.com/office/powerpoint/2012/main"/>
+    </p:ext>
+  </p:extLst>
 </p:presentation>
 </file>
 
@@ -3998,7 +4004,7 @@
           <a:p>
             <a:r>
               <a:rPr lang="en-US" dirty="0"/>
-              <a:t>Key technical techniques</a:t>
+              <a:t>Key Technical Techniques</a:t>
             </a:r>
           </a:p>
         </p:txBody>
@@ -4019,15 +4025,79 @@
             <p:ph idx="1"/>
           </p:nvPr>
         </p:nvSpPr>
-        <p:spPr/>
-        <p:txBody>
-          <a:bodyPr/>
-          <a:lstStyle/>
-          <a:p>
+        <p:spPr>
+          <a:xfrm>
+            <a:off x="838200" y="1825625"/>
+            <a:ext cx="5749031" cy="4351338"/>
+          </a:xfrm>
+        </p:spPr>
+        <p:txBody>
+          <a:bodyPr/>
+          <a:lstStyle/>
+          <a:p>
+            <a:r>
+              <a:rPr lang="en-US" dirty="0"/>
+              <a:t>Model-View-Controller architecture:</a:t>
+            </a:r>
+          </a:p>
+          <a:p>
+            <a:pPr marL="0" indent="0">
+              <a:buNone/>
+            </a:pPr>
+            <a:r>
+              <a:rPr lang="en-US" dirty="0"/>
+              <a:t>Used model-view-controller to increase scalability of </a:t>
+            </a:r>
+            <a:r>
+              <a:rPr lang="en-US"/>
+              <a:t>the program.</a:t>
+            </a:r>
             <a:endParaRPr lang="en-US" dirty="0"/>
           </a:p>
-        </p:txBody>
-      </p:sp>
+          <a:p>
+            <a:pPr marL="0" indent="0">
+              <a:buNone/>
+            </a:pPr>
+            <a:endParaRPr lang="en-US" dirty="0"/>
+          </a:p>
+        </p:txBody>
+      </p:sp>
+      <p:pic>
+        <p:nvPicPr>
+          <p:cNvPr id="5" name="Picture 4" descr="Graphical user interface, application, timeline&#10;&#10;Description automatically generated">
+            <a:extLst>
+              <a:ext uri="{FF2B5EF4-FFF2-40B4-BE49-F238E27FC236}">
+                <a16:creationId xmlns:a16="http://schemas.microsoft.com/office/drawing/2014/main" id="{7BD83CDE-436D-4F33-A57E-47854AAAD858}"/>
+              </a:ext>
+            </a:extLst>
+          </p:cNvPr>
+          <p:cNvPicPr>
+            <a:picLocks noChangeAspect="1"/>
+          </p:cNvPicPr>
+          <p:nvPr/>
+        </p:nvPicPr>
+        <p:blipFill>
+          <a:blip r:embed="rId2">
+            <a:extLst>
+              <a:ext uri="{28A0092B-C50C-407E-A947-70E740481C1C}">
+                <a14:useLocalDpi xmlns:a14="http://schemas.microsoft.com/office/drawing/2010/main" val="0"/>
+              </a:ext>
+            </a:extLst>
+          </a:blip>
+          <a:stretch>
+            <a:fillRect/>
+          </a:stretch>
+        </p:blipFill>
+        <p:spPr>
+          <a:xfrm>
+            <a:off x="6587231" y="365125"/>
+            <a:ext cx="5419725" cy="5734050"/>
+          </a:xfrm>
+          <a:prstGeom prst="rect">
+            <a:avLst/>
+          </a:prstGeom>
+        </p:spPr>
+      </p:pic>
     </p:spTree>
     <p:extLst>
       <p:ext uri="{BB962C8B-B14F-4D97-AF65-F5344CB8AC3E}">
@@ -4063,6 +4133,110 @@
           <p:cNvPr id="2" name="Title 1">
             <a:extLst>
               <a:ext uri="{FF2B5EF4-FFF2-40B4-BE49-F238E27FC236}">
+                <a16:creationId xmlns:a16="http://schemas.microsoft.com/office/drawing/2014/main" id="{076AEC39-8C40-419B-8FDC-2F7B7DE2351B}"/>
+              </a:ext>
+            </a:extLst>
+          </p:cNvPr>
+          <p:cNvSpPr>
+            <a:spLocks noGrp="1"/>
+          </p:cNvSpPr>
+          <p:nvPr>
+            <p:ph type="title"/>
+          </p:nvPr>
+        </p:nvSpPr>
+        <p:spPr/>
+        <p:txBody>
+          <a:bodyPr/>
+          <a:lstStyle/>
+          <a:p>
+            <a:r>
+              <a:rPr lang="en-US" dirty="0"/>
+              <a:t>Key Technical Techniques</a:t>
+            </a:r>
+          </a:p>
+        </p:txBody>
+      </p:sp>
+      <p:sp>
+        <p:nvSpPr>
+          <p:cNvPr id="3" name="Content Placeholder 2">
+            <a:extLst>
+              <a:ext uri="{FF2B5EF4-FFF2-40B4-BE49-F238E27FC236}">
+                <a16:creationId xmlns:a16="http://schemas.microsoft.com/office/drawing/2014/main" id="{8F34D4D2-5204-4E13-895F-7BBBC7C41DCD}"/>
+              </a:ext>
+            </a:extLst>
+          </p:cNvPr>
+          <p:cNvSpPr>
+            <a:spLocks noGrp="1"/>
+          </p:cNvSpPr>
+          <p:nvPr>
+            <p:ph idx="1"/>
+          </p:nvPr>
+        </p:nvSpPr>
+        <p:spPr/>
+        <p:txBody>
+          <a:bodyPr/>
+          <a:lstStyle/>
+          <a:p>
+            <a:r>
+              <a:rPr lang="en-US" dirty="0"/>
+              <a:t>Data source-delegate design pattern:</a:t>
+            </a:r>
+          </a:p>
+          <a:p>
+            <a:pPr marL="0" indent="0">
+              <a:buNone/>
+            </a:pPr>
+            <a:r>
+              <a:rPr lang="en-US" dirty="0"/>
+              <a:t>Used delegate and data source to communicate between the views and the view controllers.</a:t>
+            </a:r>
+          </a:p>
+          <a:p>
+            <a:endParaRPr lang="en-US" dirty="0"/>
+          </a:p>
+          <a:p>
+            <a:pPr marL="0" indent="0">
+              <a:buNone/>
+            </a:pPr>
+            <a:endParaRPr lang="en-US" dirty="0"/>
+          </a:p>
+        </p:txBody>
+      </p:sp>
+    </p:spTree>
+    <p:extLst>
+      <p:ext uri="{BB962C8B-B14F-4D97-AF65-F5344CB8AC3E}">
+        <p14:creationId xmlns:p14="http://schemas.microsoft.com/office/powerpoint/2010/main" val="2101991765"/>
+      </p:ext>
+    </p:extLst>
+  </p:cSld>
+  <p:clrMapOvr>
+    <a:masterClrMapping/>
+  </p:clrMapOvr>
+</p:sld>
+</file>
+
+<file path=ppt/slides/slide8.xml><?xml version="1.0" encoding="utf-8"?>
+<p:sld xmlns:a="http://schemas.openxmlformats.org/drawingml/2006/main" xmlns:r="http://schemas.openxmlformats.org/officeDocument/2006/relationships" xmlns:p="http://schemas.openxmlformats.org/presentationml/2006/main">
+  <p:cSld>
+    <p:spTree>
+      <p:nvGrpSpPr>
+        <p:cNvPr id="1" name=""/>
+        <p:cNvGrpSpPr/>
+        <p:nvPr/>
+      </p:nvGrpSpPr>
+      <p:grpSpPr>
+        <a:xfrm>
+          <a:off x="0" y="0"/>
+          <a:ext cx="0" cy="0"/>
+          <a:chOff x="0" y="0"/>
+          <a:chExt cx="0" cy="0"/>
+        </a:xfrm>
+      </p:grpSpPr>
+      <p:sp>
+        <p:nvSpPr>
+          <p:cNvPr id="2" name="Title 1">
+            <a:extLst>
+              <a:ext uri="{FF2B5EF4-FFF2-40B4-BE49-F238E27FC236}">
                 <a16:creationId xmlns:a16="http://schemas.microsoft.com/office/drawing/2014/main" id="{905A8ABC-312D-4B28-A875-82C8204C18F2}"/>
               </a:ext>
             </a:extLst>
@@ -4124,7 +4298,7 @@
 </p:sld>
 </file>
 
-<file path=ppt/slides/slide8.xml><?xml version="1.0" encoding="utf-8"?>
+<file path=ppt/slides/slide9.xml><?xml version="1.0" encoding="utf-8"?>
 <p:sld xmlns:a="http://schemas.openxmlformats.org/drawingml/2006/main" xmlns:r="http://schemas.openxmlformats.org/officeDocument/2006/relationships" xmlns:p="http://schemas.openxmlformats.org/presentationml/2006/main">
   <p:cSld>
     <p:spTree>

</xml_diff>